<commit_message>
add github URL into slide
</commit_message>
<xml_diff>
--- a/Presentation/B_Snake_project.pptx
+++ b/Presentation/B_Snake_project.pptx
@@ -3058,7 +3058,7 @@
         <p:spPr>
           <a:xfrm>
             <a:off x="1369959" y="2246638"/>
-            <a:ext cx="8825759" cy="3416320"/>
+            <a:ext cx="8825759" cy="3693319"/>
           </a:xfrm>
           <a:prstGeom prst="rect">
             <a:avLst/>
@@ -3103,15 +3103,7 @@
           <a:p>
             <a:r>
               <a:rPr lang="en-US" dirty="0"/>
-              <a:t>2.	Add control points -&gt; Add knot at the position of </a:t>
-            </a:r>
-            <a:r>
-              <a:rPr lang="en-US"/>
-              <a:t>sample that has </a:t>
-            </a:r>
-            <a:r>
-              <a:rPr lang="en-US" dirty="0"/>
-              <a:t>largest force.</a:t>
+              <a:t>2.	Add control points -&gt; Add knot at the position of sample that has largest force.</a:t>
             </a:r>
           </a:p>
           <a:p>
@@ -3122,6 +3114,9 @@
               <a:rPr lang="en-US" dirty="0"/>
               <a:t>This method does not work well.</a:t>
             </a:r>
+          </a:p>
+          <a:p>
+            <a:endParaRPr lang="en-US" dirty="0"/>
           </a:p>
           <a:p>
             <a:endParaRPr lang="en-US" dirty="0"/>
@@ -3333,6 +3328,36 @@
           </a:p>
         </p:txBody>
       </p:sp>
+      <p:pic>
+        <p:nvPicPr>
+          <p:cNvPr id="2" name="Picture 1">
+            <a:extLst>
+              <a:ext uri="{FF2B5EF4-FFF2-40B4-BE49-F238E27FC236}">
+                <a16:creationId xmlns:a16="http://schemas.microsoft.com/office/drawing/2014/main" id="{74205B22-3039-45C8-86B6-233FDC0F91EB}"/>
+              </a:ext>
+            </a:extLst>
+          </p:cNvPr>
+          <p:cNvPicPr>
+            <a:picLocks noChangeAspect="1"/>
+          </p:cNvPicPr>
+          <p:nvPr/>
+        </p:nvPicPr>
+        <p:blipFill>
+          <a:blip r:embed="rId4"/>
+          <a:stretch>
+            <a:fillRect/>
+          </a:stretch>
+        </p:blipFill>
+        <p:spPr>
+          <a:xfrm>
+            <a:off x="6092380" y="3928828"/>
+            <a:ext cx="3486150" cy="2219325"/>
+          </a:xfrm>
+          <a:prstGeom prst="rect">
+            <a:avLst/>
+          </a:prstGeom>
+        </p:spPr>
+      </p:pic>
     </p:spTree>
     <p:extLst>
       <p:ext uri="{BB962C8B-B14F-4D97-AF65-F5344CB8AC3E}">
@@ -3495,8 +3520,13 @@
           <a:p>
             <a:r>
               <a:rPr lang="en-US" dirty="0"/>
-              <a:t>4.Git hub: </a:t>
-            </a:r>
+              <a:t>4.Git hub</a:t>
+            </a:r>
+            <a:r>
+              <a:rPr lang="en-US"/>
+              <a:t>: https://github.com/luzengxiang/B_spline-Snake</a:t>
+            </a:r>
+            <a:endParaRPr lang="en-US" dirty="0"/>
           </a:p>
           <a:p>
             <a:endParaRPr lang="en-US" dirty="0"/>

</xml_diff>